<commit_message>
Target Users, Key Features
</commit_message>
<xml_diff>
--- a/doc/task1/red_task1.pptx
+++ b/doc/task1/red_task1.pptx
@@ -8,6 +8,8 @@
     <p:sldId id="256" r:id="rId2"/>
     <p:sldId id="257" r:id="rId3"/>
     <p:sldId id="258" r:id="rId4"/>
+    <p:sldId id="259" r:id="rId5"/>
+    <p:sldId id="260" r:id="rId6"/>
   </p:sldIdLst>
   <p:sldSz cx="12192000" cy="6858000"/>
   <p:notesSz cx="6858000" cy="9144000"/>
@@ -256,7 +258,7 @@
           <a:p>
             <a:fld id="{5EDE30F4-9768-43D9-B5D8-E0BD408A3F90}" type="datetimeFigureOut">
               <a:rPr lang="de-CH" smtClean="0"/>
-              <a:t>30.09.2016</a:t>
+              <a:t>03.10.16</a:t>
             </a:fld>
             <a:endParaRPr lang="de-CH"/>
           </a:p>
@@ -426,7 +428,7 @@
           <a:p>
             <a:fld id="{5EDE30F4-9768-43D9-B5D8-E0BD408A3F90}" type="datetimeFigureOut">
               <a:rPr lang="de-CH" smtClean="0"/>
-              <a:t>30.09.2016</a:t>
+              <a:t>03.10.16</a:t>
             </a:fld>
             <a:endParaRPr lang="de-CH"/>
           </a:p>
@@ -606,7 +608,7 @@
           <a:p>
             <a:fld id="{5EDE30F4-9768-43D9-B5D8-E0BD408A3F90}" type="datetimeFigureOut">
               <a:rPr lang="de-CH" smtClean="0"/>
-              <a:t>30.09.2016</a:t>
+              <a:t>03.10.16</a:t>
             </a:fld>
             <a:endParaRPr lang="de-CH"/>
           </a:p>
@@ -776,7 +778,7 @@
           <a:p>
             <a:fld id="{5EDE30F4-9768-43D9-B5D8-E0BD408A3F90}" type="datetimeFigureOut">
               <a:rPr lang="de-CH" smtClean="0"/>
-              <a:t>30.09.2016</a:t>
+              <a:t>03.10.16</a:t>
             </a:fld>
             <a:endParaRPr lang="de-CH"/>
           </a:p>
@@ -1022,7 +1024,7 @@
           <a:p>
             <a:fld id="{5EDE30F4-9768-43D9-B5D8-E0BD408A3F90}" type="datetimeFigureOut">
               <a:rPr lang="de-CH" smtClean="0"/>
-              <a:t>30.09.2016</a:t>
+              <a:t>03.10.16</a:t>
             </a:fld>
             <a:endParaRPr lang="de-CH"/>
           </a:p>
@@ -1254,7 +1256,7 @@
           <a:p>
             <a:fld id="{5EDE30F4-9768-43D9-B5D8-E0BD408A3F90}" type="datetimeFigureOut">
               <a:rPr lang="de-CH" smtClean="0"/>
-              <a:t>30.09.2016</a:t>
+              <a:t>03.10.16</a:t>
             </a:fld>
             <a:endParaRPr lang="de-CH"/>
           </a:p>
@@ -1621,7 +1623,7 @@
           <a:p>
             <a:fld id="{5EDE30F4-9768-43D9-B5D8-E0BD408A3F90}" type="datetimeFigureOut">
               <a:rPr lang="de-CH" smtClean="0"/>
-              <a:t>30.09.2016</a:t>
+              <a:t>03.10.16</a:t>
             </a:fld>
             <a:endParaRPr lang="de-CH"/>
           </a:p>
@@ -1739,7 +1741,7 @@
           <a:p>
             <a:fld id="{5EDE30F4-9768-43D9-B5D8-E0BD408A3F90}" type="datetimeFigureOut">
               <a:rPr lang="de-CH" smtClean="0"/>
-              <a:t>30.09.2016</a:t>
+              <a:t>03.10.16</a:t>
             </a:fld>
             <a:endParaRPr lang="de-CH"/>
           </a:p>
@@ -1834,7 +1836,7 @@
           <a:p>
             <a:fld id="{5EDE30F4-9768-43D9-B5D8-E0BD408A3F90}" type="datetimeFigureOut">
               <a:rPr lang="de-CH" smtClean="0"/>
-              <a:t>30.09.2016</a:t>
+              <a:t>03.10.16</a:t>
             </a:fld>
             <a:endParaRPr lang="de-CH"/>
           </a:p>
@@ -2111,7 +2113,7 @@
           <a:p>
             <a:fld id="{5EDE30F4-9768-43D9-B5D8-E0BD408A3F90}" type="datetimeFigureOut">
               <a:rPr lang="de-CH" smtClean="0"/>
-              <a:t>30.09.2016</a:t>
+              <a:t>03.10.16</a:t>
             </a:fld>
             <a:endParaRPr lang="de-CH"/>
           </a:p>
@@ -2364,7 +2366,7 @@
           <a:p>
             <a:fld id="{5EDE30F4-9768-43D9-B5D8-E0BD408A3F90}" type="datetimeFigureOut">
               <a:rPr lang="de-CH" smtClean="0"/>
-              <a:t>30.09.2016</a:t>
+              <a:t>03.10.16</a:t>
             </a:fld>
             <a:endParaRPr lang="de-CH"/>
           </a:p>
@@ -2577,7 +2579,7 @@
           <a:p>
             <a:fld id="{5EDE30F4-9768-43D9-B5D8-E0BD408A3F90}" type="datetimeFigureOut">
               <a:rPr lang="de-CH" smtClean="0"/>
-              <a:t>30.09.2016</a:t>
+              <a:t>03.10.16</a:t>
             </a:fld>
             <a:endParaRPr lang="de-CH"/>
           </a:p>
@@ -3005,11 +3007,6 @@
               </a:rPr>
               <a:t>CS1 - Task 01 First Analysis</a:t>
             </a:r>
-            <a:endParaRPr lang="de-CH" dirty="0" smtClean="0">
-              <a:solidFill>
-                <a:srgbClr val="FF0000"/>
-              </a:solidFill>
-            </a:endParaRPr>
           </a:p>
         </p:txBody>
       </p:sp>
@@ -3085,6 +3082,13 @@
   <p:clrMapOvr>
     <a:masterClrMapping/>
   </p:clrMapOvr>
+  <p:timing>
+    <p:tnLst>
+      <p:par>
+        <p:cTn id="1" dur="indefinite" restart="never" nodeType="tmRoot"/>
+      </p:par>
+    </p:tnLst>
+  </p:timing>
 </p:sld>
 </file>
 
@@ -3148,8 +3152,8 @@
               <a:t>Target </a:t>
             </a:r>
             <a:r>
-              <a:rPr lang="de-CH" dirty="0" err="1" smtClean="0"/>
-              <a:t>users</a:t>
+              <a:rPr lang="de-CH" dirty="0" smtClean="0"/>
+              <a:t>Users</a:t>
             </a:r>
             <a:endParaRPr lang="de-CH" dirty="0" smtClean="0"/>
           </a:p>
@@ -3159,13 +3163,10 @@
               <a:t>Key </a:t>
             </a:r>
             <a:r>
-              <a:rPr lang="de-CH" dirty="0" err="1" smtClean="0"/>
-              <a:t>features</a:t>
-            </a:r>
-            <a:r>
               <a:rPr lang="de-CH" dirty="0" smtClean="0"/>
-              <a:t> </a:t>
-            </a:r>
+              <a:t>Features </a:t>
+            </a:r>
+            <a:endParaRPr lang="de-CH" dirty="0" smtClean="0"/>
           </a:p>
           <a:p>
             <a:r>
@@ -3173,16 +3174,12 @@
               <a:t>Critical </a:t>
             </a:r>
             <a:r>
-              <a:rPr lang="de-CH" dirty="0" err="1" smtClean="0"/>
-              <a:t>success</a:t>
+              <a:rPr lang="de-CH" dirty="0"/>
+              <a:t>S</a:t>
             </a:r>
             <a:r>
               <a:rPr lang="de-CH" dirty="0" smtClean="0"/>
-              <a:t> </a:t>
-            </a:r>
-            <a:r>
-              <a:rPr lang="de-CH" dirty="0" err="1" smtClean="0"/>
-              <a:t>factors</a:t>
+              <a:t>uccess Factors</a:t>
             </a:r>
             <a:endParaRPr lang="de-CH" dirty="0"/>
           </a:p>
@@ -3198,6 +3195,13 @@
   <p:clrMapOvr>
     <a:masterClrMapping/>
   </p:clrMapOvr>
+  <p:timing>
+    <p:tnLst>
+      <p:par>
+        <p:cTn id="1" dur="indefinite" restart="never" nodeType="tmRoot"/>
+      </p:par>
+    </p:tnLst>
+  </p:timing>
 </p:sld>
 </file>
 
@@ -3256,7 +3260,101 @@
           <a:bodyPr/>
           <a:lstStyle/>
           <a:p>
-            <a:endParaRPr lang="de-CH"/>
+            <a:r>
+              <a:rPr lang="de-CH" dirty="0" smtClean="0"/>
+              <a:t>Clinical </a:t>
+            </a:r>
+            <a:r>
+              <a:rPr lang="de-CH" dirty="0" err="1" smtClean="0"/>
+              <a:t>staff</a:t>
+            </a:r>
+            <a:endParaRPr lang="de-CH" dirty="0" smtClean="0"/>
+          </a:p>
+          <a:p>
+            <a:pPr lvl="1"/>
+            <a:r>
+              <a:rPr lang="de-CH" dirty="0" err="1" smtClean="0"/>
+              <a:t>Doctors</a:t>
+            </a:r>
+            <a:endParaRPr lang="de-CH" dirty="0" smtClean="0"/>
+          </a:p>
+          <a:p>
+            <a:pPr lvl="1"/>
+            <a:r>
+              <a:rPr lang="de-CH" dirty="0" err="1" smtClean="0"/>
+              <a:t>Nurses</a:t>
+            </a:r>
+            <a:endParaRPr lang="de-CH" dirty="0" smtClean="0"/>
+          </a:p>
+          <a:p>
+            <a:pPr lvl="1"/>
+            <a:r>
+              <a:rPr lang="de-CH" dirty="0" err="1" smtClean="0"/>
+              <a:t>Health</a:t>
+            </a:r>
+            <a:r>
+              <a:rPr lang="de-CH" dirty="0" smtClean="0"/>
+              <a:t> </a:t>
+            </a:r>
+            <a:r>
+              <a:rPr lang="de-CH" dirty="0" err="1" smtClean="0"/>
+              <a:t>visitors</a:t>
+            </a:r>
+            <a:endParaRPr lang="de-CH" dirty="0" smtClean="0"/>
+          </a:p>
+          <a:p>
+            <a:r>
+              <a:rPr lang="de-CH" dirty="0" err="1" smtClean="0"/>
+              <a:t>Receptionists</a:t>
+            </a:r>
+            <a:r>
+              <a:rPr lang="de-CH" dirty="0"/>
+              <a:t> </a:t>
+            </a:r>
+            <a:r>
+              <a:rPr lang="de-CH" dirty="0" err="1" smtClean="0"/>
+              <a:t>who</a:t>
+            </a:r>
+            <a:r>
+              <a:rPr lang="de-CH" dirty="0" smtClean="0"/>
+              <a:t> </a:t>
+            </a:r>
+            <a:r>
+              <a:rPr lang="de-CH" dirty="0" err="1" smtClean="0"/>
+              <a:t>make</a:t>
+            </a:r>
+            <a:r>
+              <a:rPr lang="de-CH" dirty="0" smtClean="0"/>
+              <a:t> </a:t>
+            </a:r>
+            <a:r>
+              <a:rPr lang="de-CH" dirty="0" err="1" smtClean="0"/>
+              <a:t>appointments</a:t>
+            </a:r>
+            <a:endParaRPr lang="de-CH" dirty="0" smtClean="0"/>
+          </a:p>
+          <a:p>
+            <a:r>
+              <a:rPr lang="de-CH" dirty="0" smtClean="0"/>
+              <a:t>Medical </a:t>
+            </a:r>
+            <a:r>
+              <a:rPr lang="de-CH" dirty="0" err="1" smtClean="0"/>
+              <a:t>records</a:t>
+            </a:r>
+            <a:r>
+              <a:rPr lang="de-CH" dirty="0" smtClean="0"/>
+              <a:t> </a:t>
+            </a:r>
+            <a:r>
+              <a:rPr lang="de-CH" dirty="0" err="1" smtClean="0"/>
+              <a:t>staff</a:t>
+            </a:r>
+            <a:endParaRPr lang="de-CH" dirty="0" smtClean="0"/>
+          </a:p>
+          <a:p>
+            <a:pPr lvl="2"/>
+            <a:endParaRPr lang="de-CH" dirty="0" smtClean="0"/>
           </a:p>
         </p:txBody>
       </p:sp>
@@ -3270,6 +3368,222 @@
   <p:clrMapOvr>
     <a:masterClrMapping/>
   </p:clrMapOvr>
+  <p:timing>
+    <p:tnLst>
+      <p:par>
+        <p:cTn id="1" dur="indefinite" restart="never" nodeType="tmRoot"/>
+      </p:par>
+    </p:tnLst>
+  </p:timing>
+</p:sld>
+</file>
+
+<file path=ppt/slides/slide4.xml><?xml version="1.0" encoding="utf-8"?>
+<p:sld xmlns:a="http://schemas.openxmlformats.org/drawingml/2006/main" xmlns:r="http://schemas.openxmlformats.org/officeDocument/2006/relationships" xmlns:p="http://schemas.openxmlformats.org/presentationml/2006/main">
+  <p:cSld>
+    <p:spTree>
+      <p:nvGrpSpPr>
+        <p:cNvPr id="1" name=""/>
+        <p:cNvGrpSpPr/>
+        <p:nvPr/>
+      </p:nvGrpSpPr>
+      <p:grpSpPr>
+        <a:xfrm>
+          <a:off x="0" y="0"/>
+          <a:ext cx="0" cy="0"/>
+          <a:chOff x="0" y="0"/>
+          <a:chExt cx="0" cy="0"/>
+        </a:xfrm>
+      </p:grpSpPr>
+      <p:sp>
+        <p:nvSpPr>
+          <p:cNvPr id="2" name="Titel 1"/>
+          <p:cNvSpPr>
+            <a:spLocks noGrp="1"/>
+          </p:cNvSpPr>
+          <p:nvPr>
+            <p:ph type="title"/>
+          </p:nvPr>
+        </p:nvSpPr>
+        <p:spPr/>
+        <p:txBody>
+          <a:bodyPr/>
+          <a:lstStyle/>
+          <a:p>
+            <a:r>
+              <a:rPr lang="de-CH" dirty="0" smtClean="0"/>
+              <a:t>Key Features</a:t>
+            </a:r>
+            <a:endParaRPr lang="de-CH" dirty="0"/>
+          </a:p>
+        </p:txBody>
+      </p:sp>
+      <p:sp>
+        <p:nvSpPr>
+          <p:cNvPr id="3" name="Inhaltsplatzhalter 2"/>
+          <p:cNvSpPr>
+            <a:spLocks noGrp="1"/>
+          </p:cNvSpPr>
+          <p:nvPr>
+            <p:ph idx="1"/>
+          </p:nvPr>
+        </p:nvSpPr>
+        <p:spPr/>
+        <p:txBody>
+          <a:bodyPr/>
+          <a:lstStyle/>
+          <a:p>
+            <a:r>
+              <a:rPr lang="de-CH" dirty="0" smtClean="0"/>
+              <a:t>Informationen zur rechten Zeit</a:t>
+            </a:r>
+          </a:p>
+          <a:p>
+            <a:pPr lvl="1"/>
+            <a:r>
+              <a:rPr lang="de-CH" dirty="0" smtClean="0"/>
+              <a:t>Erleichtert die Behandlung von Patienten</a:t>
+            </a:r>
+          </a:p>
+          <a:p>
+            <a:r>
+              <a:rPr lang="de-CH" dirty="0" smtClean="0"/>
+              <a:t>Generierung von Management-Informationen</a:t>
+            </a:r>
+          </a:p>
+          <a:p>
+            <a:pPr lvl="1"/>
+            <a:r>
+              <a:rPr lang="de-CH" dirty="0" smtClean="0"/>
+              <a:t>Erlaubt (Managern des Gesundheitswesens) die Beurteilung von lokalen und staatlichen Zielen</a:t>
+            </a:r>
+          </a:p>
+          <a:p>
+            <a:r>
+              <a:rPr lang="de-CH" dirty="0" smtClean="0"/>
+              <a:t>Einschätzung Gefährlichkeitsgrad eines Patienten</a:t>
+            </a:r>
+          </a:p>
+          <a:p>
+            <a:r>
+              <a:rPr lang="de-CH" dirty="0" smtClean="0"/>
+              <a:t>Lediglich psychische Krankheitsangaben</a:t>
+            </a:r>
+          </a:p>
+          <a:p>
+            <a:r>
+              <a:rPr lang="de-CH" dirty="0" smtClean="0"/>
+              <a:t>Verlauf</a:t>
+            </a:r>
+          </a:p>
+          <a:p>
+            <a:r>
+              <a:rPr lang="de-CH" dirty="0" smtClean="0"/>
+              <a:t>Terminplanung</a:t>
+            </a:r>
+          </a:p>
+          <a:p>
+            <a:pPr lvl="1"/>
+            <a:endParaRPr lang="de-CH" dirty="0"/>
+          </a:p>
+        </p:txBody>
+      </p:sp>
+    </p:spTree>
+    <p:extLst>
+      <p:ext uri="{BB962C8B-B14F-4D97-AF65-F5344CB8AC3E}">
+        <p14:creationId xmlns:p14="http://schemas.microsoft.com/office/powerpoint/2010/main" val="1670797998"/>
+      </p:ext>
+    </p:extLst>
+  </p:cSld>
+  <p:clrMapOvr>
+    <a:masterClrMapping/>
+  </p:clrMapOvr>
+  <p:timing>
+    <p:tnLst>
+      <p:par>
+        <p:cTn id="1" dur="indefinite" restart="never" nodeType="tmRoot"/>
+      </p:par>
+    </p:tnLst>
+  </p:timing>
+</p:sld>
+</file>
+
+<file path=ppt/slides/slide5.xml><?xml version="1.0" encoding="utf-8"?>
+<p:sld xmlns:a="http://schemas.openxmlformats.org/drawingml/2006/main" xmlns:r="http://schemas.openxmlformats.org/officeDocument/2006/relationships" xmlns:p="http://schemas.openxmlformats.org/presentationml/2006/main">
+  <p:cSld>
+    <p:spTree>
+      <p:nvGrpSpPr>
+        <p:cNvPr id="1" name=""/>
+        <p:cNvGrpSpPr/>
+        <p:nvPr/>
+      </p:nvGrpSpPr>
+      <p:grpSpPr>
+        <a:xfrm>
+          <a:off x="0" y="0"/>
+          <a:ext cx="0" cy="0"/>
+          <a:chOff x="0" y="0"/>
+          <a:chExt cx="0" cy="0"/>
+        </a:xfrm>
+      </p:grpSpPr>
+      <p:sp>
+        <p:nvSpPr>
+          <p:cNvPr id="2" name="Titel 1"/>
+          <p:cNvSpPr>
+            <a:spLocks noGrp="1"/>
+          </p:cNvSpPr>
+          <p:nvPr>
+            <p:ph type="title"/>
+          </p:nvPr>
+        </p:nvSpPr>
+        <p:spPr/>
+        <p:txBody>
+          <a:bodyPr/>
+          <a:lstStyle/>
+          <a:p>
+            <a:r>
+              <a:rPr lang="de-CH" dirty="0" smtClean="0"/>
+              <a:t>Critical Success Factors</a:t>
+            </a:r>
+            <a:endParaRPr lang="de-CH" dirty="0"/>
+          </a:p>
+        </p:txBody>
+      </p:sp>
+      <p:sp>
+        <p:nvSpPr>
+          <p:cNvPr id="3" name="Inhaltsplatzhalter 2"/>
+          <p:cNvSpPr>
+            <a:spLocks noGrp="1"/>
+          </p:cNvSpPr>
+          <p:nvPr>
+            <p:ph idx="1"/>
+          </p:nvPr>
+        </p:nvSpPr>
+        <p:spPr/>
+        <p:txBody>
+          <a:bodyPr/>
+          <a:lstStyle/>
+          <a:p>
+            <a:endParaRPr lang="de-CH" dirty="0"/>
+          </a:p>
+        </p:txBody>
+      </p:sp>
+    </p:spTree>
+    <p:extLst>
+      <p:ext uri="{BB962C8B-B14F-4D97-AF65-F5344CB8AC3E}">
+        <p14:creationId xmlns:p14="http://schemas.microsoft.com/office/powerpoint/2010/main" val="195314271"/>
+      </p:ext>
+    </p:extLst>
+  </p:cSld>
+  <p:clrMapOvr>
+    <a:masterClrMapping/>
+  </p:clrMapOvr>
+  <p:timing>
+    <p:tnLst>
+      <p:par>
+        <p:cTn id="1" dur="indefinite" restart="never" nodeType="tmRoot"/>
+      </p:par>
+    </p:tnLst>
+  </p:timing>
 </p:sld>
 </file>
 

</xml_diff>

<commit_message>
Fertigstellung des 1. Tasks
</commit_message>
<xml_diff>
--- a/doc/task1/red_task1.pptx
+++ b/doc/task1/red_task1.pptx
@@ -3125,48 +3125,38 @@
           <a:lstStyle/>
           <a:p>
             <a:r>
+              <a:rPr lang="de-CH" b="1" dirty="0" smtClean="0"/>
+              <a:t>Content</a:t>
+            </a:r>
+            <a:endParaRPr lang="de-CH" b="1" dirty="0"/>
+          </a:p>
+        </p:txBody>
+      </p:sp>
+      <p:sp>
+        <p:nvSpPr>
+          <p:cNvPr id="3" name="Inhaltsplatzhalter 2"/>
+          <p:cNvSpPr>
+            <a:spLocks noGrp="1"/>
+          </p:cNvSpPr>
+          <p:nvPr>
+            <p:ph idx="1"/>
+          </p:nvPr>
+        </p:nvSpPr>
+        <p:spPr/>
+        <p:txBody>
+          <a:bodyPr/>
+          <a:lstStyle/>
+          <a:p>
+            <a:r>
               <a:rPr lang="de-CH" dirty="0" smtClean="0"/>
-              <a:t>Content</a:t>
-            </a:r>
-            <a:endParaRPr lang="de-CH" dirty="0"/>
-          </a:p>
-        </p:txBody>
-      </p:sp>
-      <p:sp>
-        <p:nvSpPr>
-          <p:cNvPr id="3" name="Inhaltsplatzhalter 2"/>
-          <p:cNvSpPr>
-            <a:spLocks noGrp="1"/>
-          </p:cNvSpPr>
-          <p:nvPr>
-            <p:ph idx="1"/>
-          </p:nvPr>
-        </p:nvSpPr>
-        <p:spPr/>
-        <p:txBody>
-          <a:bodyPr/>
-          <a:lstStyle/>
+              <a:t>Target Users</a:t>
+            </a:r>
+          </a:p>
           <a:p>
             <a:r>
               <a:rPr lang="de-CH" dirty="0" smtClean="0"/>
-              <a:t>Target </a:t>
-            </a:r>
-            <a:r>
-              <a:rPr lang="de-CH" dirty="0" smtClean="0"/>
-              <a:t>Users</a:t>
-            </a:r>
-            <a:endParaRPr lang="de-CH" dirty="0" smtClean="0"/>
-          </a:p>
-          <a:p>
-            <a:r>
-              <a:rPr lang="de-CH" dirty="0" smtClean="0"/>
-              <a:t>Key </a:t>
-            </a:r>
-            <a:r>
-              <a:rPr lang="de-CH" dirty="0" smtClean="0"/>
-              <a:t>Features </a:t>
-            </a:r>
-            <a:endParaRPr lang="de-CH" dirty="0" smtClean="0"/>
+              <a:t>Key Features </a:t>
+            </a:r>
           </a:p>
           <a:p>
             <a:r>
@@ -3238,10 +3228,10 @@
           <a:lstStyle/>
           <a:p>
             <a:r>
-              <a:rPr lang="de-CH" dirty="0" smtClean="0"/>
+              <a:rPr lang="de-CH" b="1" dirty="0" smtClean="0"/>
               <a:t>Target Users</a:t>
             </a:r>
-            <a:endParaRPr lang="de-CH" dirty="0"/>
+            <a:endParaRPr lang="de-CH" b="1" dirty="0"/>
           </a:p>
         </p:txBody>
       </p:sp>
@@ -3411,10 +3401,10 @@
           <a:lstStyle/>
           <a:p>
             <a:r>
-              <a:rPr lang="de-CH" dirty="0" smtClean="0"/>
+              <a:rPr lang="de-CH" b="1" dirty="0" smtClean="0"/>
               <a:t>Key Features</a:t>
             </a:r>
-            <a:endParaRPr lang="de-CH" dirty="0"/>
+            <a:endParaRPr lang="de-CH" b="1" dirty="0"/>
           </a:p>
         </p:txBody>
       </p:sp>
@@ -3541,28 +3531,112 @@
           <a:lstStyle/>
           <a:p>
             <a:r>
+              <a:rPr lang="de-CH" b="1" dirty="0" smtClean="0"/>
+              <a:t>Critical Success Factors</a:t>
+            </a:r>
+            <a:endParaRPr lang="de-CH" b="1" dirty="0"/>
+          </a:p>
+        </p:txBody>
+      </p:sp>
+      <p:sp>
+        <p:nvSpPr>
+          <p:cNvPr id="3" name="Inhaltsplatzhalter 2"/>
+          <p:cNvSpPr>
+            <a:spLocks noGrp="1"/>
+          </p:cNvSpPr>
+          <p:nvPr>
+            <p:ph idx="1"/>
+          </p:nvPr>
+        </p:nvSpPr>
+        <p:spPr/>
+        <p:txBody>
+          <a:bodyPr>
+            <a:normAutofit lnSpcReduction="10000"/>
+          </a:bodyPr>
+          <a:lstStyle/>
+          <a:p>
+            <a:r>
               <a:rPr lang="de-CH" dirty="0" smtClean="0"/>
-              <a:t>Critical Success Factors</a:t>
-            </a:r>
-            <a:endParaRPr lang="de-CH" dirty="0"/>
-          </a:p>
-        </p:txBody>
-      </p:sp>
-      <p:sp>
-        <p:nvSpPr>
-          <p:cNvPr id="3" name="Inhaltsplatzhalter 2"/>
-          <p:cNvSpPr>
-            <a:spLocks noGrp="1"/>
-          </p:cNvSpPr>
-          <p:nvPr>
-            <p:ph idx="1"/>
-          </p:nvPr>
-        </p:nvSpPr>
-        <p:spPr/>
-        <p:txBody>
-          <a:bodyPr/>
-          <a:lstStyle/>
-          <a:p>
+              <a:t>Projekt-Organisation</a:t>
+            </a:r>
+          </a:p>
+          <a:p>
+            <a:pPr lvl="1"/>
+            <a:r>
+              <a:rPr lang="de-CH" dirty="0" smtClean="0"/>
+              <a:t>Verfügbarkeit</a:t>
+            </a:r>
+          </a:p>
+          <a:p>
+            <a:pPr lvl="1"/>
+            <a:r>
+              <a:rPr lang="de-CH" dirty="0" smtClean="0"/>
+              <a:t>Rollenverteilung</a:t>
+            </a:r>
+          </a:p>
+          <a:p>
+            <a:r>
+              <a:rPr lang="de-CH" dirty="0" smtClean="0"/>
+              <a:t>Projektmanagement</a:t>
+            </a:r>
+          </a:p>
+          <a:p>
+            <a:pPr lvl="1"/>
+            <a:r>
+              <a:rPr lang="de-CH" dirty="0" smtClean="0"/>
+              <a:t>Strategie-Planung</a:t>
+            </a:r>
+          </a:p>
+          <a:p>
+            <a:pPr lvl="1"/>
+            <a:r>
+              <a:rPr lang="de-CH" dirty="0" smtClean="0"/>
+              <a:t>Frühzeitige Erkennung und Vermeidung von Risiken</a:t>
+            </a:r>
+          </a:p>
+          <a:p>
+            <a:r>
+              <a:rPr lang="de-CH" dirty="0" smtClean="0"/>
+              <a:t>Kommunikation im Team</a:t>
+            </a:r>
+          </a:p>
+          <a:p>
+            <a:r>
+              <a:rPr lang="de-CH" dirty="0" smtClean="0"/>
+              <a:t>Zusammenarbeit mit Kunden</a:t>
+            </a:r>
+          </a:p>
+          <a:p>
+            <a:r>
+              <a:rPr lang="de-CH" dirty="0" smtClean="0"/>
+              <a:t>Finanzen</a:t>
+            </a:r>
+          </a:p>
+          <a:p>
+            <a:r>
+              <a:rPr lang="de-CH" dirty="0" err="1" smtClean="0"/>
+              <a:t>Know-How</a:t>
+            </a:r>
+            <a:endParaRPr lang="de-CH" dirty="0" smtClean="0"/>
+          </a:p>
+          <a:p>
+            <a:pPr lvl="1"/>
+            <a:endParaRPr lang="de-CH" dirty="0" smtClean="0"/>
+          </a:p>
+          <a:p>
+            <a:pPr lvl="1"/>
+            <a:endParaRPr lang="de-CH" dirty="0" smtClean="0"/>
+          </a:p>
+          <a:p>
+            <a:pPr lvl="1"/>
+            <a:endParaRPr lang="de-CH" dirty="0" smtClean="0"/>
+          </a:p>
+          <a:p>
+            <a:pPr lvl="1"/>
+            <a:endParaRPr lang="de-CH" dirty="0" smtClean="0"/>
+          </a:p>
+          <a:p>
+            <a:pPr lvl="1"/>
             <a:endParaRPr lang="de-CH" dirty="0"/>
           </a:p>
         </p:txBody>

</xml_diff>